<commit_message>
Updated Science Catalog page
Made some minor tweaks to the Science Catalog page
</commit_message>
<xml_diff>
--- a/assets/Metadata_System_Architecture_PowerPoint/Metadata_System_Architecture.pptx
+++ b/assets/Metadata_System_Architecture_PowerPoint/Metadata_System_Architecture.pptx
@@ -131,13 +131,84 @@
 <file path=ppt/revisionInfo.xml><?xml version="1.0" encoding="utf-8"?>
 <p1510:revInfo xmlns:a="http://schemas.openxmlformats.org/drawingml/2006/main" xmlns:r="http://schemas.openxmlformats.org/officeDocument/2006/relationships" xmlns:p1510="http://schemas.microsoft.com/office/powerpoint/2015/10/main">
   <p1510:revLst>
-    <p1510:client id="{2E765D45-F01F-4C8E-B920-321B02B582F2}" v="1" dt="2024-04-17T20:43:41.858"/>
+    <p1510:client id="{D40E747B-DBB4-435B-8C51-ACA97BEB267F}" v="1" dt="2024-07-03T12:15:56.557"/>
   </p1510:revLst>
 </p1510:revInfo>
 </file>
 
 <file path=ppt/changesInfos/changesInfo1.xml><?xml version="1.0" encoding="utf-8"?>
 <pc:chgInfo xmlns:a="http://schemas.openxmlformats.org/drawingml/2006/main" xmlns:r="http://schemas.openxmlformats.org/officeDocument/2006/relationships" xmlns:ac="http://schemas.microsoft.com/office/drawing/2013/main/command" xmlns:pc="http://schemas.microsoft.com/office/powerpoint/2013/main/command">
+  <pc:docChgLst>
+    <pc:chgData name="Massey, Blake H" userId="1216071c-74eb-431e-bcbb-1fe11e6acb14" providerId="ADAL" clId="{D40E747B-DBB4-435B-8C51-ACA97BEB267F}"/>
+    <pc:docChg chg="undo custSel modSld">
+      <pc:chgData name="Massey, Blake H" userId="1216071c-74eb-431e-bcbb-1fe11e6acb14" providerId="ADAL" clId="{D40E747B-DBB4-435B-8C51-ACA97BEB267F}" dt="2024-07-03T12:16:21.028" v="37" actId="1038"/>
+      <pc:docMkLst>
+        <pc:docMk/>
+      </pc:docMkLst>
+      <pc:sldChg chg="modSp mod">
+        <pc:chgData name="Massey, Blake H" userId="1216071c-74eb-431e-bcbb-1fe11e6acb14" providerId="ADAL" clId="{D40E747B-DBB4-435B-8C51-ACA97BEB267F}" dt="2024-07-03T12:15:07.536" v="0" actId="1076"/>
+        <pc:sldMkLst>
+          <pc:docMk/>
+          <pc:sldMk cId="3231909131" sldId="258"/>
+        </pc:sldMkLst>
+        <pc:spChg chg="mod">
+          <ac:chgData name="Massey, Blake H" userId="1216071c-74eb-431e-bcbb-1fe11e6acb14" providerId="ADAL" clId="{D40E747B-DBB4-435B-8C51-ACA97BEB267F}" dt="2024-07-03T12:15:07.536" v="0" actId="1076"/>
+          <ac:spMkLst>
+            <pc:docMk/>
+            <pc:sldMk cId="3231909131" sldId="258"/>
+            <ac:spMk id="7" creationId="{7F3E2AF7-6E3F-8C32-1829-EB7E56754D48}"/>
+          </ac:spMkLst>
+        </pc:spChg>
+        <pc:grpChg chg="mod">
+          <ac:chgData name="Massey, Blake H" userId="1216071c-74eb-431e-bcbb-1fe11e6acb14" providerId="ADAL" clId="{D40E747B-DBB4-435B-8C51-ACA97BEB267F}" dt="2024-07-03T12:15:07.536" v="0" actId="1076"/>
+          <ac:grpSpMkLst>
+            <pc:docMk/>
+            <pc:sldMk cId="3231909131" sldId="258"/>
+            <ac:grpSpMk id="10" creationId="{E20322E7-EC1C-5D72-BE2C-BAE61840D5C6}"/>
+          </ac:grpSpMkLst>
+        </pc:grpChg>
+      </pc:sldChg>
+      <pc:sldChg chg="addSp delSp modSp mod">
+        <pc:chgData name="Massey, Blake H" userId="1216071c-74eb-431e-bcbb-1fe11e6acb14" providerId="ADAL" clId="{D40E747B-DBB4-435B-8C51-ACA97BEB267F}" dt="2024-07-03T12:16:21.028" v="37" actId="1038"/>
+        <pc:sldMkLst>
+          <pc:docMk/>
+          <pc:sldMk cId="3248887762" sldId="260"/>
+        </pc:sldMkLst>
+        <pc:spChg chg="add del">
+          <ac:chgData name="Massey, Blake H" userId="1216071c-74eb-431e-bcbb-1fe11e6acb14" providerId="ADAL" clId="{D40E747B-DBB4-435B-8C51-ACA97BEB267F}" dt="2024-07-03T12:15:54.139" v="10" actId="22"/>
+          <ac:spMkLst>
+            <pc:docMk/>
+            <pc:sldMk cId="3248887762" sldId="260"/>
+            <ac:spMk id="3" creationId="{268392E1-A1AB-E642-FB70-FA3A348B2AD0}"/>
+          </ac:spMkLst>
+        </pc:spChg>
+        <pc:spChg chg="add mod">
+          <ac:chgData name="Massey, Blake H" userId="1216071c-74eb-431e-bcbb-1fe11e6acb14" providerId="ADAL" clId="{D40E747B-DBB4-435B-8C51-ACA97BEB267F}" dt="2024-07-03T12:16:21.028" v="37" actId="1038"/>
+          <ac:spMkLst>
+            <pc:docMk/>
+            <pc:sldMk cId="3248887762" sldId="260"/>
+            <ac:spMk id="4" creationId="{664B40D5-4B18-290B-315C-A947726D463A}"/>
+          </ac:spMkLst>
+        </pc:spChg>
+        <pc:spChg chg="mod">
+          <ac:chgData name="Massey, Blake H" userId="1216071c-74eb-431e-bcbb-1fe11e6acb14" providerId="ADAL" clId="{D40E747B-DBB4-435B-8C51-ACA97BEB267F}" dt="2024-07-03T12:15:46.005" v="8" actId="1037"/>
+          <ac:spMkLst>
+            <pc:docMk/>
+            <pc:sldMk cId="3248887762" sldId="260"/>
+            <ac:spMk id="69" creationId="{29F62814-CFC8-39D0-B9F0-57EE71C7ACFF}"/>
+          </ac:spMkLst>
+        </pc:spChg>
+        <pc:picChg chg="mod">
+          <ac:chgData name="Massey, Blake H" userId="1216071c-74eb-431e-bcbb-1fe11e6acb14" providerId="ADAL" clId="{D40E747B-DBB4-435B-8C51-ACA97BEB267F}" dt="2024-07-03T12:15:46.005" v="8" actId="1037"/>
+          <ac:picMkLst>
+            <pc:docMk/>
+            <pc:sldMk cId="3248887762" sldId="260"/>
+            <ac:picMk id="70" creationId="{5256A853-EF62-DEB4-E75F-A1E2648F72FD}"/>
+          </ac:picMkLst>
+        </pc:picChg>
+      </pc:sldChg>
+    </pc:docChg>
+  </pc:docChgLst>
   <pc:docChgLst>
     <pc:chgData name="Massey, Blake H" userId="1216071c-74eb-431e-bcbb-1fe11e6acb14" providerId="ADAL" clId="{2E765D45-F01F-4C8E-B920-321B02B582F2}"/>
     <pc:docChg chg="modSld sldOrd">
@@ -3832,7 +3903,7 @@
           <a:p>
             <a:fld id="{2F3B0BD4-F5D8-41F9-9354-B14D27600A1D}" type="datetimeFigureOut">
               <a:rPr lang="en-US" smtClean="0"/>
-              <a:t>4/17/2024</a:t>
+              <a:t>2024-07-03</a:t>
             </a:fld>
             <a:endParaRPr lang="en-US"/>
           </a:p>
@@ -4030,7 +4101,7 @@
           <a:p>
             <a:fld id="{2F3B0BD4-F5D8-41F9-9354-B14D27600A1D}" type="datetimeFigureOut">
               <a:rPr lang="en-US" smtClean="0"/>
-              <a:t>4/17/2024</a:t>
+              <a:t>2024-07-03</a:t>
             </a:fld>
             <a:endParaRPr lang="en-US"/>
           </a:p>
@@ -4238,7 +4309,7 @@
           <a:p>
             <a:fld id="{2F3B0BD4-F5D8-41F9-9354-B14D27600A1D}" type="datetimeFigureOut">
               <a:rPr lang="en-US" smtClean="0"/>
-              <a:t>4/17/2024</a:t>
+              <a:t>2024-07-03</a:t>
             </a:fld>
             <a:endParaRPr lang="en-US"/>
           </a:p>
@@ -4436,7 +4507,7 @@
           <a:p>
             <a:fld id="{2F3B0BD4-F5D8-41F9-9354-B14D27600A1D}" type="datetimeFigureOut">
               <a:rPr lang="en-US" smtClean="0"/>
-              <a:t>4/17/2024</a:t>
+              <a:t>2024-07-03</a:t>
             </a:fld>
             <a:endParaRPr lang="en-US"/>
           </a:p>
@@ -4711,7 +4782,7 @@
           <a:p>
             <a:fld id="{2F3B0BD4-F5D8-41F9-9354-B14D27600A1D}" type="datetimeFigureOut">
               <a:rPr lang="en-US" smtClean="0"/>
-              <a:t>4/17/2024</a:t>
+              <a:t>2024-07-03</a:t>
             </a:fld>
             <a:endParaRPr lang="en-US"/>
           </a:p>
@@ -4976,7 +5047,7 @@
           <a:p>
             <a:fld id="{2F3B0BD4-F5D8-41F9-9354-B14D27600A1D}" type="datetimeFigureOut">
               <a:rPr lang="en-US" smtClean="0"/>
-              <a:t>4/17/2024</a:t>
+              <a:t>2024-07-03</a:t>
             </a:fld>
             <a:endParaRPr lang="en-US"/>
           </a:p>
@@ -5388,7 +5459,7 @@
           <a:p>
             <a:fld id="{2F3B0BD4-F5D8-41F9-9354-B14D27600A1D}" type="datetimeFigureOut">
               <a:rPr lang="en-US" smtClean="0"/>
-              <a:t>4/17/2024</a:t>
+              <a:t>2024-07-03</a:t>
             </a:fld>
             <a:endParaRPr lang="en-US"/>
           </a:p>
@@ -5529,7 +5600,7 @@
           <a:p>
             <a:fld id="{2F3B0BD4-F5D8-41F9-9354-B14D27600A1D}" type="datetimeFigureOut">
               <a:rPr lang="en-US" smtClean="0"/>
-              <a:t>4/17/2024</a:t>
+              <a:t>2024-07-03</a:t>
             </a:fld>
             <a:endParaRPr lang="en-US"/>
           </a:p>
@@ -5642,7 +5713,7 @@
           <a:p>
             <a:fld id="{2F3B0BD4-F5D8-41F9-9354-B14D27600A1D}" type="datetimeFigureOut">
               <a:rPr lang="en-US" smtClean="0"/>
-              <a:t>4/17/2024</a:t>
+              <a:t>2024-07-03</a:t>
             </a:fld>
             <a:endParaRPr lang="en-US"/>
           </a:p>
@@ -5953,7 +6024,7 @@
           <a:p>
             <a:fld id="{2F3B0BD4-F5D8-41F9-9354-B14D27600A1D}" type="datetimeFigureOut">
               <a:rPr lang="en-US" smtClean="0"/>
-              <a:t>4/17/2024</a:t>
+              <a:t>2024-07-03</a:t>
             </a:fld>
             <a:endParaRPr lang="en-US"/>
           </a:p>
@@ -6241,7 +6312,7 @@
           <a:p>
             <a:fld id="{2F3B0BD4-F5D8-41F9-9354-B14D27600A1D}" type="datetimeFigureOut">
               <a:rPr lang="en-US" smtClean="0"/>
-              <a:t>4/17/2024</a:t>
+              <a:t>2024-07-03</a:t>
             </a:fld>
             <a:endParaRPr lang="en-US"/>
           </a:p>
@@ -6482,7 +6553,7 @@
           <a:p>
             <a:fld id="{2F3B0BD4-F5D8-41F9-9354-B14D27600A1D}" type="datetimeFigureOut">
               <a:rPr lang="en-US" smtClean="0"/>
-              <a:t>4/17/2024</a:t>
+              <a:t>2024-07-03</a:t>
             </a:fld>
             <a:endParaRPr lang="en-US"/>
           </a:p>
@@ -9141,7 +9212,7 @@
         </p:nvSpPr>
         <p:spPr>
           <a:xfrm>
-            <a:off x="8408465" y="1521927"/>
+            <a:off x="8298398" y="1521927"/>
             <a:ext cx="877581" cy="276999"/>
           </a:xfrm>
           <a:prstGeom prst="rect">
@@ -9187,7 +9258,7 @@
         </p:blipFill>
         <p:spPr>
           <a:xfrm>
-            <a:off x="8453129" y="1692624"/>
+            <a:off x="8343062" y="1692624"/>
             <a:ext cx="750927" cy="352442"/>
           </a:xfrm>
           <a:prstGeom prst="rect">
@@ -10406,6 +10477,44 @@
           <a:p>
             <a:pPr algn="ctr"/>
             <a:endParaRPr lang="en-US"/>
+          </a:p>
+        </p:txBody>
+      </p:sp>
+      <p:sp>
+        <p:nvSpPr>
+          <p:cNvPr id="4" name="TextBox 3">
+            <a:extLst>
+              <a:ext uri="{FF2B5EF4-FFF2-40B4-BE49-F238E27FC236}">
+                <a16:creationId xmlns:a16="http://schemas.microsoft.com/office/drawing/2014/main" id="{664B40D5-4B18-290B-315C-A947726D463A}"/>
+              </a:ext>
+            </a:extLst>
+          </p:cNvPr>
+          <p:cNvSpPr txBox="1"/>
+          <p:nvPr/>
+        </p:nvSpPr>
+        <p:spPr>
+          <a:xfrm>
+            <a:off x="8363308" y="2145514"/>
+            <a:ext cx="806198" cy="276999"/>
+          </a:xfrm>
+          <a:prstGeom prst="rect">
+            <a:avLst/>
+          </a:prstGeom>
+          <a:noFill/>
+        </p:spPr>
+        <p:txBody>
+          <a:bodyPr wrap="square" rtlCol="0">
+            <a:spAutoFit/>
+          </a:bodyPr>
+          <a:lstStyle/>
+          <a:p>
+            <a:r>
+              <a:rPr lang="en-US" sz="1200" dirty="0">
+                <a:latin typeface="Arial" panose="020B0604020202020204" pitchFamily="34" charset="0"/>
+                <a:cs typeface="Arial" panose="020B0604020202020204" pitchFamily="34" charset="0"/>
+              </a:rPr>
+              <a:t>Products</a:t>
+            </a:r>
           </a:p>
         </p:txBody>
       </p:sp>
@@ -13574,7 +13683,7 @@
         </p:nvSpPr>
         <p:spPr>
           <a:xfrm>
-            <a:off x="4230192" y="5095835"/>
+            <a:off x="3826874" y="3927435"/>
             <a:ext cx="4205548" cy="1569660"/>
           </a:xfrm>
           <a:prstGeom prst="rect">
@@ -13629,7 +13738,7 @@
         </p:nvGrpSpPr>
         <p:grpSpPr>
           <a:xfrm>
-            <a:off x="3543417" y="3517292"/>
+            <a:off x="3140099" y="2348892"/>
             <a:ext cx="5579097" cy="1569660"/>
             <a:chOff x="3183903" y="4028651"/>
             <a:chExt cx="5579097" cy="1569660"/>
@@ -17844,14 +17953,12 @@
 </file>
 
 <file path=customXml/item1.xml><?xml version="1.0" encoding="utf-8"?>
-<p:properties xmlns:p="http://schemas.microsoft.com/office/2006/metadata/properties" xmlns:xsi="http://www.w3.org/2001/XMLSchema-instance" xmlns:pc="http://schemas.microsoft.com/office/infopath/2007/PartnerControls">
-  <documentManagement>
-    <lcf76f155ced4ddcb4097134ff3c332f xmlns="db87db67-96a3-4d72-91a8-81563af8600c">
-      <Terms xmlns="http://schemas.microsoft.com/office/infopath/2007/PartnerControls"/>
-    </lcf76f155ced4ddcb4097134ff3c332f>
-    <TaxCatchAll xmlns="31062a0d-ede8-4112-b4bb-00a9c1bc8e16" xsi:nil="true"/>
-  </documentManagement>
-</p:properties>
+<?mso-contentType ?>
+<FormTemplates xmlns="http://schemas.microsoft.com/sharepoint/v3/contenttype/forms">
+  <Display>DocumentLibraryForm</Display>
+  <Edit>DocumentLibraryForm</Edit>
+  <New>DocumentLibraryForm</New>
+</FormTemplates>
 </file>
 
 <file path=customXml/item2.xml><?xml version="1.0" encoding="utf-8"?>
@@ -18095,28 +18202,20 @@
 </file>
 
 <file path=customXml/item3.xml><?xml version="1.0" encoding="utf-8"?>
-<?mso-contentType ?>
-<FormTemplates xmlns="http://schemas.microsoft.com/sharepoint/v3/contenttype/forms">
-  <Display>DocumentLibraryForm</Display>
-  <Edit>DocumentLibraryForm</Edit>
-  <New>DocumentLibraryForm</New>
-</FormTemplates>
+<p:properties xmlns:p="http://schemas.microsoft.com/office/2006/metadata/properties" xmlns:xsi="http://www.w3.org/2001/XMLSchema-instance" xmlns:pc="http://schemas.microsoft.com/office/infopath/2007/PartnerControls">
+  <documentManagement>
+    <lcf76f155ced4ddcb4097134ff3c332f xmlns="db87db67-96a3-4d72-91a8-81563af8600c">
+      <Terms xmlns="http://schemas.microsoft.com/office/infopath/2007/PartnerControls"/>
+    </lcf76f155ced4ddcb4097134ff3c332f>
+    <TaxCatchAll xmlns="31062a0d-ede8-4112-b4bb-00a9c1bc8e16" xsi:nil="true"/>
+  </documentManagement>
+</p:properties>
 </file>
 
 <file path=customXml/itemProps1.xml><?xml version="1.0" encoding="utf-8"?>
-<ds:datastoreItem xmlns:ds="http://schemas.openxmlformats.org/officeDocument/2006/customXml" ds:itemID="{BEFAA33E-CE3C-4FBC-AC45-C1B2A87C655E}">
+<ds:datastoreItem xmlns:ds="http://schemas.openxmlformats.org/officeDocument/2006/customXml" ds:itemID="{D2C9E12A-69ED-4F7F-BE34-9607F5B60EAA}">
   <ds:schemaRefs>
-    <ds:schemaRef ds:uri="http://schemas.microsoft.com/office/infopath/2007/PartnerControls"/>
-    <ds:schemaRef ds:uri="http://schemas.microsoft.com/office/2006/documentManagement/types"/>
-    <ds:schemaRef ds:uri="http://purl.org/dc/terms/"/>
-    <ds:schemaRef ds:uri="31062a0d-ede8-4112-b4bb-00a9c1bc8e16"/>
-    <ds:schemaRef ds:uri="http://schemas.microsoft.com/office/2006/metadata/properties"/>
-    <ds:schemaRef ds:uri="http://www.w3.org/XML/1998/namespace"/>
-    <ds:schemaRef ds:uri="http://purl.org/dc/elements/1.1/"/>
-    <ds:schemaRef ds:uri="48bb7575-d4a1-41b2-9b61-de08cfdbf3b5"/>
-    <ds:schemaRef ds:uri="http://schemas.openxmlformats.org/package/2006/metadata/core-properties"/>
-    <ds:schemaRef ds:uri="db87db67-96a3-4d72-91a8-81563af8600c"/>
-    <ds:schemaRef ds:uri="http://purl.org/dc/dcmitype/"/>
+    <ds:schemaRef ds:uri="http://schemas.microsoft.com/sharepoint/v3/contenttype/forms"/>
   </ds:schemaRefs>
 </ds:datastoreItem>
 </file>
@@ -18142,9 +18241,19 @@
 </file>
 
 <file path=customXml/itemProps3.xml><?xml version="1.0" encoding="utf-8"?>
-<ds:datastoreItem xmlns:ds="http://schemas.openxmlformats.org/officeDocument/2006/customXml" ds:itemID="{D2C9E12A-69ED-4F7F-BE34-9607F5B60EAA}">
+<ds:datastoreItem xmlns:ds="http://schemas.openxmlformats.org/officeDocument/2006/customXml" ds:itemID="{BEFAA33E-CE3C-4FBC-AC45-C1B2A87C655E}">
   <ds:schemaRefs>
-    <ds:schemaRef ds:uri="http://schemas.microsoft.com/sharepoint/v3/contenttype/forms"/>
+    <ds:schemaRef ds:uri="http://schemas.microsoft.com/office/infopath/2007/PartnerControls"/>
+    <ds:schemaRef ds:uri="http://schemas.microsoft.com/office/2006/documentManagement/types"/>
+    <ds:schemaRef ds:uri="http://purl.org/dc/terms/"/>
+    <ds:schemaRef ds:uri="31062a0d-ede8-4112-b4bb-00a9c1bc8e16"/>
+    <ds:schemaRef ds:uri="http://schemas.microsoft.com/office/2006/metadata/properties"/>
+    <ds:schemaRef ds:uri="http://www.w3.org/XML/1998/namespace"/>
+    <ds:schemaRef ds:uri="http://purl.org/dc/elements/1.1/"/>
+    <ds:schemaRef ds:uri="48bb7575-d4a1-41b2-9b61-de08cfdbf3b5"/>
+    <ds:schemaRef ds:uri="http://schemas.openxmlformats.org/package/2006/metadata/core-properties"/>
+    <ds:schemaRef ds:uri="db87db67-96a3-4d72-91a8-81563af8600c"/>
+    <ds:schemaRef ds:uri="http://purl.org/dc/dcmitype/"/>
   </ds:schemaRefs>
 </ds:datastoreItem>
 </file>
</xml_diff>